<commit_message>
minor rewording on one slide
</commit_message>
<xml_diff>
--- a/PowerPoints/09 - Constraint Analysis.pptx
+++ b/PowerPoints/09 - Constraint Analysis.pptx
@@ -7260,7 +7260,7 @@
             </a:r>
             <a:r>
               <a:rPr lang="en-US" dirty="0"/>
-              <a:t>, or a user defined string type.  (Output is supported only for integers, characters, </a:t>
+              <a:t>, or a string type.  Output is supported only for integers, characters, </a:t>
             </a:r>
             <a:r>
               <a:rPr lang="en-US" dirty="0" err="1"/>
@@ -7268,7 +7268,7 @@
             </a:r>
             <a:r>
               <a:rPr lang="en-US" dirty="0"/>
-              <a:t>, and strings.)</a:t>
+              <a:t>, and strings.</a:t>
             </a:r>
           </a:p>
           <a:p>
@@ -7306,8 +7306,21 @@
             </a:r>
             <a:r>
               <a:rPr lang="en-US" dirty="0"/>
-              <a:t>, or a programmer-defined string type.  (Input is supported only for integers, characters, and strings.)</a:t>
-            </a:r>
+              <a:t>, or a string type.  </a:t>
+            </a:r>
+            <a:r>
+              <a:rPr lang="en-US"/>
+              <a:t>Input </a:t>
+            </a:r>
+            <a:r>
+              <a:rPr lang="en-US" dirty="0"/>
+              <a:t>is supported only for integers, characters, and </a:t>
+            </a:r>
+            <a:r>
+              <a:rPr lang="en-US"/>
+              <a:t>strings.</a:t>
+            </a:r>
+            <a:endParaRPr lang="en-US" dirty="0"/>
           </a:p>
           <a:p>
             <a:endParaRPr lang="en-US" dirty="0"/>

</xml_diff>

<commit_message>
added missing right paren on one slide
</commit_message>
<xml_diff>
--- a/PowerPoints/09 - Constraint Analysis.pptx
+++ b/PowerPoints/09 - Constraint Analysis.pptx
@@ -8131,8 +8131,17 @@
               <a:rPr lang="en-US" sz="1800" dirty="0">
                 <a:latin typeface="Consolas" pitchFamily="49" charset="0"/>
               </a:rPr>
-              <a:t>(), expr)</a:t>
-            </a:r>
+              <a:t>(), </a:t>
+            </a:r>
+            <a:r>
+              <a:rPr lang="en-US" sz="1800">
+                <a:latin typeface="Consolas" pitchFamily="49" charset="0"/>
+              </a:rPr>
+              <a:t>expr))</a:t>
+            </a:r>
+            <a:endParaRPr lang="en-US" sz="1800" dirty="0">
+              <a:latin typeface="Consolas" pitchFamily="49" charset="0"/>
+            </a:endParaRPr>
           </a:p>
           <a:p>
             <a:pPr marL="182880" indent="0">

</xml_diff>